<commit_message>
changes and adding lesson 2.
</commit_message>
<xml_diff>
--- a/ppts/Lesson1.pptx
+++ b/ppts/Lesson1.pptx
@@ -125,8 +125,7 @@
 <file path=ppt/revisionInfo.xml><?xml version="1.0" encoding="utf-8"?>
 <p1510:revInfo xmlns:a="http://schemas.openxmlformats.org/drawingml/2006/main" xmlns:r="http://schemas.openxmlformats.org/officeDocument/2006/relationships" xmlns:p1510="http://schemas.microsoft.com/office/powerpoint/2015/10/main">
   <p1510:revLst>
-    <p1510:client id="{654E7802-0545-4417-8273-A756B6B8EE69}" v="6" dt="2024-04-08T16:02:57.058"/>
-    <p1510:client id="{AD7A7424-52E0-D2FC-B571-9FDD7AEA5838}" v="9" dt="2024-04-08T15:59:21.661"/>
+    <p1510:client id="{654E7802-0545-4417-8273-A756B6B8EE69}" v="7" dt="2024-04-15T20:19:47.020"/>
   </p1510:revLst>
 </p1510:revInfo>
 </file>
@@ -136,7 +135,7 @@
   <pc:docChgLst>
     <pc:chgData name="Chris Rickman" userId="b429bcee-74e4-4099-af08-44f1b84bb381" providerId="ADAL" clId="{654E7802-0545-4417-8273-A756B6B8EE69}"/>
     <pc:docChg chg="undo custSel modSld">
-      <pc:chgData name="Chris Rickman" userId="b429bcee-74e4-4099-af08-44f1b84bb381" providerId="ADAL" clId="{654E7802-0545-4417-8273-A756B6B8EE69}" dt="2024-04-08T17:57:27.367" v="257" actId="313"/>
+      <pc:chgData name="Chris Rickman" userId="b429bcee-74e4-4099-af08-44f1b84bb381" providerId="ADAL" clId="{654E7802-0545-4417-8273-A756B6B8EE69}" dt="2024-04-23T21:04:29.013" v="1640" actId="20577"/>
       <pc:docMkLst>
         <pc:docMk/>
       </pc:docMkLst>
@@ -196,17 +195,48 @@
         </pc:picChg>
       </pc:sldChg>
       <pc:sldChg chg="modSp mod">
-        <pc:chgData name="Chris Rickman" userId="b429bcee-74e4-4099-af08-44f1b84bb381" providerId="ADAL" clId="{654E7802-0545-4417-8273-A756B6B8EE69}" dt="2024-04-08T17:57:27.367" v="257" actId="313"/>
+        <pc:chgData name="Chris Rickman" userId="b429bcee-74e4-4099-af08-44f1b84bb381" providerId="ADAL" clId="{654E7802-0545-4417-8273-A756B6B8EE69}" dt="2024-04-15T19:29:50.059" v="267" actId="20577"/>
+        <pc:sldMkLst>
+          <pc:docMk/>
+          <pc:sldMk cId="551584792" sldId="2147480353"/>
+        </pc:sldMkLst>
+        <pc:spChg chg="mod">
+          <ac:chgData name="Chris Rickman" userId="b429bcee-74e4-4099-af08-44f1b84bb381" providerId="ADAL" clId="{654E7802-0545-4417-8273-A756B6B8EE69}" dt="2024-04-15T19:29:50.059" v="267" actId="20577"/>
+          <ac:spMkLst>
+            <pc:docMk/>
+            <pc:sldMk cId="551584792" sldId="2147480353"/>
+            <ac:spMk id="6" creationId="{4238AE2B-11DF-D1E3-B789-94E5F3DCE01B}"/>
+          </ac:spMkLst>
+        </pc:spChg>
+      </pc:sldChg>
+      <pc:sldChg chg="delSp modSp mod modNotesTx">
+        <pc:chgData name="Chris Rickman" userId="b429bcee-74e4-4099-af08-44f1b84bb381" providerId="ADAL" clId="{654E7802-0545-4417-8273-A756B6B8EE69}" dt="2024-04-23T21:04:29.013" v="1640" actId="20577"/>
         <pc:sldMkLst>
           <pc:docMk/>
           <pc:sldMk cId="786746050" sldId="2147480357"/>
         </pc:sldMkLst>
         <pc:spChg chg="mod">
-          <ac:chgData name="Chris Rickman" userId="b429bcee-74e4-4099-af08-44f1b84bb381" providerId="ADAL" clId="{654E7802-0545-4417-8273-A756B6B8EE69}" dt="2024-04-08T17:57:27.367" v="257" actId="313"/>
+          <ac:chgData name="Chris Rickman" userId="b429bcee-74e4-4099-af08-44f1b84bb381" providerId="ADAL" clId="{654E7802-0545-4417-8273-A756B6B8EE69}" dt="2024-04-23T21:04:29.013" v="1640" actId="20577"/>
           <ac:spMkLst>
             <pc:docMk/>
             <pc:sldMk cId="786746050" sldId="2147480357"/>
             <ac:spMk id="7" creationId="{2DC32A47-06E6-60DA-051F-E1791A1D4FFC}"/>
+          </ac:spMkLst>
+        </pc:spChg>
+        <pc:spChg chg="del mod">
+          <ac:chgData name="Chris Rickman" userId="b429bcee-74e4-4099-af08-44f1b84bb381" providerId="ADAL" clId="{654E7802-0545-4417-8273-A756B6B8EE69}" dt="2024-04-15T19:58:44.552" v="269" actId="478"/>
+          <ac:spMkLst>
+            <pc:docMk/>
+            <pc:sldMk cId="786746050" sldId="2147480357"/>
+            <ac:spMk id="10" creationId="{5F7442E4-CA46-4EBD-07CD-5E2C120C373B}"/>
+          </ac:spMkLst>
+        </pc:spChg>
+        <pc:spChg chg="mod">
+          <ac:chgData name="Chris Rickman" userId="b429bcee-74e4-4099-af08-44f1b84bb381" providerId="ADAL" clId="{654E7802-0545-4417-8273-A756B6B8EE69}" dt="2024-04-15T20:07:59.173" v="655" actId="14100"/>
+          <ac:spMkLst>
+            <pc:docMk/>
+            <pc:sldMk cId="786746050" sldId="2147480357"/>
+            <ac:spMk id="11" creationId="{F178DF49-D276-1EA2-FC0D-417590297948}"/>
           </ac:spMkLst>
         </pc:spChg>
       </pc:sldChg>
@@ -1272,7 +1302,7 @@
           <a:p>
             <a:fld id="{B1966D0E-6323-4B53-AD4C-A8BF5E0757DB}" type="datetimeFigureOut">
               <a:rPr lang="en-US" smtClean="0"/>
-              <a:t>4/8/2024</a:t>
+              <a:t>4/23/2024</a:t>
             </a:fld>
             <a:endParaRPr lang="en-US"/>
           </a:p>
@@ -1682,13 +1712,8 @@
           <a:p>
             <a:r>
               <a:rPr lang="en-US" dirty="0"/>
-              <a:t>Let’s get right into the Agenda.  I have 3 guest speakers joining us today.  Matthew will be providing us with SK roadmap update, Sophia will provide a doc/sample update and Chris will give an update on Features.  I will then dive into Why SK then we will dive right into Lesson 1 by building </a:t>
+              <a:t>Let’s get right into the Agenda.  I have 3 guest speakers joining us today.  Matthew will be providing us with SK roadmap update, Sophia will provide a doc/sample update and Chris will give an update on Features.  I will then dive into Why SK then we will dive right into Lesson 1 by building our first app.   </a:t>
             </a:r>
-            <a:r>
-              <a:rPr lang="en-US"/>
-              <a:t>our first app.   </a:t>
-            </a:r>
-            <a:endParaRPr lang="en-US" dirty="0"/>
           </a:p>
         </p:txBody>
       </p:sp>
@@ -1948,8 +1973,47 @@
           <a:p>
             <a:r>
               <a:rPr lang="en-US" dirty="0"/>
-              <a:t>10 </a:t>
+              <a:t>(Should be well under 5 minutes)</a:t>
             </a:r>
+          </a:p>
+          <a:p>
+            <a:endParaRPr lang="en-US" dirty="0"/>
+          </a:p>
+          <a:p>
+            <a:r>
+              <a:rPr lang="en-US" dirty="0"/>
+              <a:t>Once you are comfortable using SK for LLM requests, you’ll quickly want to add function calling to your repertoire.</a:t>
+            </a:r>
+          </a:p>
+          <a:p>
+            <a:endParaRPr lang="en-US" dirty="0"/>
+          </a:p>
+          <a:p>
+            <a:r>
+              <a:rPr lang="en-US" dirty="0"/>
+              <a:t>Filters support advanced visibility and intercept requirements.</a:t>
+            </a:r>
+          </a:p>
+          <a:p>
+            <a:endParaRPr lang="en-US" dirty="0"/>
+          </a:p>
+          <a:p>
+            <a:r>
+              <a:rPr lang="en-US" dirty="0"/>
+              <a:t>Structuring the LLM response as a predetermined JSON result facilitates application integration</a:t>
+            </a:r>
+          </a:p>
+          <a:p>
+            <a:endParaRPr lang="en-US" dirty="0"/>
+          </a:p>
+          <a:p>
+            <a:r>
+              <a:rPr lang="en-US" dirty="0"/>
+              <a:t>Non-textual content types included as part of SK’s core abstractions.</a:t>
+            </a:r>
+          </a:p>
+          <a:p>
+            <a:endParaRPr lang="en-US" dirty="0"/>
           </a:p>
         </p:txBody>
       </p:sp>
@@ -2357,7 +2421,7 @@
           <a:p>
             <a:fld id="{BB12C7E7-2854-453C-ADEE-85B5D7007E18}" type="datetimeFigureOut">
               <a:rPr lang="en-US" smtClean="0"/>
-              <a:t>4/8/2024</a:t>
+              <a:t>4/23/2024</a:t>
             </a:fld>
             <a:endParaRPr lang="en-US"/>
           </a:p>
@@ -2555,7 +2619,7 @@
           <a:p>
             <a:fld id="{BB12C7E7-2854-453C-ADEE-85B5D7007E18}" type="datetimeFigureOut">
               <a:rPr lang="en-US" smtClean="0"/>
-              <a:t>4/8/2024</a:t>
+              <a:t>4/23/2024</a:t>
             </a:fld>
             <a:endParaRPr lang="en-US"/>
           </a:p>
@@ -2763,7 +2827,7 @@
           <a:p>
             <a:fld id="{BB12C7E7-2854-453C-ADEE-85B5D7007E18}" type="datetimeFigureOut">
               <a:rPr lang="en-US" smtClean="0"/>
-              <a:t>4/8/2024</a:t>
+              <a:t>4/23/2024</a:t>
             </a:fld>
             <a:endParaRPr lang="en-US"/>
           </a:p>
@@ -3020,7 +3084,7 @@
           <a:p>
             <a:fld id="{BB12C7E7-2854-453C-ADEE-85B5D7007E18}" type="datetimeFigureOut">
               <a:rPr lang="en-US" smtClean="0"/>
-              <a:t>4/8/2024</a:t>
+              <a:t>4/23/2024</a:t>
             </a:fld>
             <a:endParaRPr lang="en-US"/>
           </a:p>
@@ -3295,7 +3359,7 @@
           <a:p>
             <a:fld id="{BB12C7E7-2854-453C-ADEE-85B5D7007E18}" type="datetimeFigureOut">
               <a:rPr lang="en-US" smtClean="0"/>
-              <a:t>4/8/2024</a:t>
+              <a:t>4/23/2024</a:t>
             </a:fld>
             <a:endParaRPr lang="en-US"/>
           </a:p>
@@ -3560,7 +3624,7 @@
           <a:p>
             <a:fld id="{BB12C7E7-2854-453C-ADEE-85B5D7007E18}" type="datetimeFigureOut">
               <a:rPr lang="en-US" smtClean="0"/>
-              <a:t>4/8/2024</a:t>
+              <a:t>4/23/2024</a:t>
             </a:fld>
             <a:endParaRPr lang="en-US"/>
           </a:p>
@@ -3972,7 +4036,7 @@
           <a:p>
             <a:fld id="{BB12C7E7-2854-453C-ADEE-85B5D7007E18}" type="datetimeFigureOut">
               <a:rPr lang="en-US" smtClean="0"/>
-              <a:t>4/8/2024</a:t>
+              <a:t>4/23/2024</a:t>
             </a:fld>
             <a:endParaRPr lang="en-US"/>
           </a:p>
@@ -4113,7 +4177,7 @@
           <a:p>
             <a:fld id="{BB12C7E7-2854-453C-ADEE-85B5D7007E18}" type="datetimeFigureOut">
               <a:rPr lang="en-US" smtClean="0"/>
-              <a:t>4/8/2024</a:t>
+              <a:t>4/23/2024</a:t>
             </a:fld>
             <a:endParaRPr lang="en-US"/>
           </a:p>
@@ -4226,7 +4290,7 @@
           <a:p>
             <a:fld id="{BB12C7E7-2854-453C-ADEE-85B5D7007E18}" type="datetimeFigureOut">
               <a:rPr lang="en-US" smtClean="0"/>
-              <a:t>4/8/2024</a:t>
+              <a:t>4/23/2024</a:t>
             </a:fld>
             <a:endParaRPr lang="en-US"/>
           </a:p>
@@ -4537,7 +4601,7 @@
           <a:p>
             <a:fld id="{BB12C7E7-2854-453C-ADEE-85B5D7007E18}" type="datetimeFigureOut">
               <a:rPr lang="en-US" smtClean="0"/>
-              <a:t>4/8/2024</a:t>
+              <a:t>4/23/2024</a:t>
             </a:fld>
             <a:endParaRPr lang="en-US"/>
           </a:p>
@@ -4825,7 +4889,7 @@
           <a:p>
             <a:fld id="{BB12C7E7-2854-453C-ADEE-85B5D7007E18}" type="datetimeFigureOut">
               <a:rPr lang="en-US" smtClean="0"/>
-              <a:t>4/8/2024</a:t>
+              <a:t>4/23/2024</a:t>
             </a:fld>
             <a:endParaRPr lang="en-US"/>
           </a:p>
@@ -5066,7 +5130,7 @@
           <a:p>
             <a:fld id="{BB12C7E7-2854-453C-ADEE-85B5D7007E18}" type="datetimeFigureOut">
               <a:rPr lang="en-US" smtClean="0"/>
-              <a:t>4/8/2024</a:t>
+              <a:t>4/23/2024</a:t>
             </a:fld>
             <a:endParaRPr lang="en-US"/>
           </a:p>
@@ -12686,8 +12750,8 @@
         </p:nvSpPr>
         <p:spPr>
           <a:xfrm>
-            <a:off x="411480" y="2684095"/>
-            <a:ext cx="4443154" cy="3492868"/>
+            <a:off x="411479" y="2684095"/>
+            <a:ext cx="7018021" cy="3492868"/>
           </a:xfrm>
         </p:spPr>
         <p:txBody>
@@ -12696,8 +12760,14 @@
           </a:bodyPr>
           <a:lstStyle/>
           <a:p>
+            <a:pPr marL="0" indent="0">
+              <a:spcBef>
+                <a:spcPts val="1800"/>
+              </a:spcBef>
+              <a:buNone/>
+            </a:pPr>
             <a:r>
-              <a:rPr lang="en-US" sz="1800" dirty="0">
+              <a:rPr lang="en-US" sz="2400" dirty="0">
                 <a:solidFill>
                   <a:schemeClr val="accent1">
                     <a:lumMod val="75000"/>
@@ -12706,10 +12776,17 @@
                 <a:latin typeface="Segoe UI Semibold" panose="020B0702040204020203" pitchFamily="34" charset="0"/>
                 <a:cs typeface="Segoe UI Semibold" panose="020B0702040204020203" pitchFamily="34" charset="0"/>
               </a:rPr>
-              <a:t>Prompt Design: History / Training Shots / Identity </a:t>
+              <a:t>A couple features to call-out for after familiar with core Semantic Kernel patterns: </a:t>
             </a:r>
+          </a:p>
+          <a:p>
+            <a:pPr>
+              <a:spcBef>
+                <a:spcPts val="1800"/>
+              </a:spcBef>
+            </a:pPr>
             <a:r>
-              <a:rPr lang="en-US" sz="1800">
+              <a:rPr lang="en-US" sz="2400" dirty="0">
                 <a:solidFill>
                   <a:schemeClr val="accent1">
                     <a:lumMod val="75000"/>
@@ -12718,21 +12795,36 @@
                 <a:latin typeface="Segoe UI Semibold" panose="020B0702040204020203" pitchFamily="34" charset="0"/>
                 <a:cs typeface="Segoe UI Semibold" panose="020B0702040204020203" pitchFamily="34" charset="0"/>
               </a:rPr>
-              <a:t>/ “No Shot”</a:t>
+              <a:t>Function Calling</a:t>
             </a:r>
-            <a:endParaRPr lang="en-US" sz="1800" dirty="0">
-              <a:solidFill>
-                <a:schemeClr val="accent1">
-                  <a:lumMod val="75000"/>
-                </a:schemeClr>
-              </a:solidFill>
-              <a:latin typeface="Segoe UI Semibold" panose="020B0702040204020203" pitchFamily="34" charset="0"/>
-              <a:cs typeface="Segoe UI Semibold" panose="020B0702040204020203" pitchFamily="34" charset="0"/>
-            </a:endParaRPr>
-          </a:p>
-          <a:p>
+          </a:p>
+          <a:p>
+            <a:pPr>
+              <a:spcBef>
+                <a:spcPts val="1800"/>
+              </a:spcBef>
+            </a:pPr>
             <a:r>
-              <a:rPr lang="en-US" sz="1800" dirty="0">
+              <a:rPr lang="en-US" sz="2400" dirty="0">
+                <a:solidFill>
+                  <a:schemeClr val="accent1">
+                    <a:lumMod val="75000"/>
+                  </a:schemeClr>
+                </a:solidFill>
+                <a:latin typeface="Segoe UI Semibold" panose="020B0702040204020203" pitchFamily="34" charset="0"/>
+                <a:cs typeface="Segoe UI Semibold" panose="020B0702040204020203" pitchFamily="34" charset="0"/>
+              </a:rPr>
+              <a:t>Filters: Prompt &amp; Function</a:t>
+            </a:r>
+          </a:p>
+          <a:p>
+            <a:pPr>
+              <a:spcBef>
+                <a:spcPts val="1800"/>
+              </a:spcBef>
+            </a:pPr>
+            <a:r>
+              <a:rPr lang="en-US" sz="2400" dirty="0">
                 <a:solidFill>
                   <a:schemeClr val="accent1">
                     <a:lumMod val="75000"/>
@@ -12745,37 +12837,47 @@
             </a:r>
           </a:p>
           <a:p>
-            <a:endParaRPr lang="en-US" sz="1800" dirty="0">
-              <a:solidFill>
-                <a:schemeClr val="accent1">
-                  <a:lumMod val="75000"/>
-                </a:schemeClr>
-              </a:solidFill>
-              <a:latin typeface="Segoe UI Semibold" panose="020B0702040204020203" pitchFamily="34" charset="0"/>
-              <a:cs typeface="Segoe UI Semibold" panose="020B0702040204020203" pitchFamily="34" charset="0"/>
-            </a:endParaRPr>
-          </a:p>
-          <a:p>
-            <a:endParaRPr lang="en-US" sz="1800" dirty="0">
-              <a:solidFill>
-                <a:schemeClr val="accent1">
-                  <a:lumMod val="75000"/>
-                </a:schemeClr>
-              </a:solidFill>
-              <a:latin typeface="Segoe UI Semibold" panose="020B0702040204020203" pitchFamily="34" charset="0"/>
-              <a:cs typeface="Segoe UI Semibold" panose="020B0702040204020203" pitchFamily="34" charset="0"/>
-            </a:endParaRPr>
-          </a:p>
-          <a:p>
-            <a:endParaRPr lang="en-US" sz="1800" dirty="0">
-              <a:solidFill>
-                <a:schemeClr val="accent1">
-                  <a:lumMod val="75000"/>
-                </a:schemeClr>
-              </a:solidFill>
-              <a:latin typeface="Segoe UI Semibold" panose="020B0702040204020203" pitchFamily="34" charset="0"/>
-              <a:cs typeface="Segoe UI Semibold" panose="020B0702040204020203" pitchFamily="34" charset="0"/>
-            </a:endParaRPr>
+            <a:pPr>
+              <a:spcBef>
+                <a:spcPts val="1800"/>
+              </a:spcBef>
+            </a:pPr>
+            <a:r>
+              <a:rPr lang="en-US" sz="2400" b="1" dirty="0">
+                <a:solidFill>
+                  <a:schemeClr val="accent1">
+                    <a:lumMod val="75000"/>
+                  </a:schemeClr>
+                </a:solidFill>
+                <a:latin typeface="Segoe UI Semibold" panose="020B0702040204020203" pitchFamily="34" charset="0"/>
+                <a:cs typeface="Segoe UI Semibold" panose="020B0702040204020203" pitchFamily="34" charset="0"/>
+              </a:rPr>
+              <a:t>Content Types</a:t>
+            </a:r>
+            <a:r>
+              <a:rPr lang="en-US" sz="2400" b="1">
+                <a:solidFill>
+                  <a:schemeClr val="accent1">
+                    <a:lumMod val="75000"/>
+                  </a:schemeClr>
+                </a:solidFill>
+                <a:latin typeface="Segoe UI Semibold" panose="020B0702040204020203" pitchFamily="34" charset="0"/>
+                <a:cs typeface="Segoe UI Semibold" panose="020B0702040204020203" pitchFamily="34" charset="0"/>
+              </a:rPr>
+              <a:t>: Text, </a:t>
+            </a:r>
+            <a:r>
+              <a:rPr lang="en-US" sz="2400" b="1" dirty="0">
+                <a:solidFill>
+                  <a:schemeClr val="accent1">
+                    <a:lumMod val="75000"/>
+                  </a:schemeClr>
+                </a:solidFill>
+                <a:latin typeface="Segoe UI Semibold" panose="020B0702040204020203" pitchFamily="34" charset="0"/>
+                <a:cs typeface="Segoe UI Semibold" panose="020B0702040204020203" pitchFamily="34" charset="0"/>
+              </a:rPr>
+              <a:t>Audio, Image, File</a:t>
+            </a:r>
           </a:p>
         </p:txBody>
       </p:sp>
@@ -12794,7 +12896,7 @@
         <p:spPr>
           <a:xfrm>
             <a:off x="541020" y="2181497"/>
-            <a:ext cx="4443154" cy="45719"/>
+            <a:ext cx="6553744" cy="45719"/>
           </a:xfrm>
           <a:prstGeom prst="rect">
             <a:avLst/>
@@ -12948,47 +13050,6 @@
           </a:prstGeom>
         </p:spPr>
       </p:pic>
-      <p:sp>
-        <p:nvSpPr>
-          <p:cNvPr id="10" name="TextBox 9">
-            <a:extLst>
-              <a:ext uri="{FF2B5EF4-FFF2-40B4-BE49-F238E27FC236}">
-                <a16:creationId xmlns:a16="http://schemas.microsoft.com/office/drawing/2014/main" id="{5F7442E4-CA46-4EBD-07CD-5E2C120C373B}"/>
-              </a:ext>
-            </a:extLst>
-          </p:cNvPr>
-          <p:cNvSpPr txBox="1"/>
-          <p:nvPr/>
-        </p:nvSpPr>
-        <p:spPr>
-          <a:xfrm rot="19424843">
-            <a:off x="1929802" y="2730832"/>
-            <a:ext cx="7937109" cy="523220"/>
-          </a:xfrm>
-          <a:prstGeom prst="rect">
-            <a:avLst/>
-          </a:prstGeom>
-          <a:noFill/>
-        </p:spPr>
-        <p:txBody>
-          <a:bodyPr wrap="none" rtlCol="0">
-            <a:spAutoFit/>
-          </a:bodyPr>
-          <a:lstStyle/>
-          <a:p>
-            <a:r>
-              <a:rPr lang="en-US" sz="2800" dirty="0">
-                <a:solidFill>
-                  <a:srgbClr val="FF0000">
-                    <a:alpha val="22000"/>
-                  </a:srgbClr>
-                </a:solidFill>
-              </a:rPr>
-              <a:t>10 mins for update (delete this after adding topics)</a:t>
-            </a:r>
-          </a:p>
-        </p:txBody>
-      </p:sp>
       <p:pic>
         <p:nvPicPr>
           <p:cNvPr id="5" name="Picture 4" descr="A green frog puppet coming out of a hole in a white wall&#10;&#10;Description automatically generated">
@@ -13643,7 +13704,7 @@
                 <a:latin typeface="Segoe UI Semibold" panose="020B0702040204020203" pitchFamily="34" charset="0"/>
                 <a:cs typeface="Segoe UI Semibold" panose="020B0702040204020203" pitchFamily="34" charset="0"/>
               </a:rPr>
-              <a:t>First-class agent support</a:t>
+              <a:t>Integrated agent support</a:t>
             </a:r>
           </a:p>
         </p:txBody>

</xml_diff>